<commit_message>
nginx-oidc-netiq dockerfile & flow
</commit_message>
<xml_diff>
--- a/docs/img/nginx-oidc-flow.pptx
+++ b/docs/img/nginx-oidc-flow.pptx
@@ -259,7 +259,7 @@
           <a:p>
             <a:fld id="{FD36D0CE-793F-FB41-AD4F-0C45D94A4FBD}" type="datetimeFigureOut">
               <a:rPr lang="en-US" smtClean="0"/>
-              <a:t>9/16/22</a:t>
+              <a:t>3/28/24</a:t>
             </a:fld>
             <a:endParaRPr lang="en-US"/>
           </a:p>
@@ -457,7 +457,7 @@
           <a:p>
             <a:fld id="{FD36D0CE-793F-FB41-AD4F-0C45D94A4FBD}" type="datetimeFigureOut">
               <a:rPr lang="en-US" smtClean="0"/>
-              <a:t>9/16/22</a:t>
+              <a:t>3/28/24</a:t>
             </a:fld>
             <a:endParaRPr lang="en-US"/>
           </a:p>
@@ -665,7 +665,7 @@
           <a:p>
             <a:fld id="{FD36D0CE-793F-FB41-AD4F-0C45D94A4FBD}" type="datetimeFigureOut">
               <a:rPr lang="en-US" smtClean="0"/>
-              <a:t>9/16/22</a:t>
+              <a:t>3/28/24</a:t>
             </a:fld>
             <a:endParaRPr lang="en-US"/>
           </a:p>
@@ -863,7 +863,7 @@
           <a:p>
             <a:fld id="{FD36D0CE-793F-FB41-AD4F-0C45D94A4FBD}" type="datetimeFigureOut">
               <a:rPr lang="en-US" smtClean="0"/>
-              <a:t>9/16/22</a:t>
+              <a:t>3/28/24</a:t>
             </a:fld>
             <a:endParaRPr lang="en-US"/>
           </a:p>
@@ -1138,7 +1138,7 @@
           <a:p>
             <a:fld id="{FD36D0CE-793F-FB41-AD4F-0C45D94A4FBD}" type="datetimeFigureOut">
               <a:rPr lang="en-US" smtClean="0"/>
-              <a:t>9/16/22</a:t>
+              <a:t>3/28/24</a:t>
             </a:fld>
             <a:endParaRPr lang="en-US"/>
           </a:p>
@@ -1403,7 +1403,7 @@
           <a:p>
             <a:fld id="{FD36D0CE-793F-FB41-AD4F-0C45D94A4FBD}" type="datetimeFigureOut">
               <a:rPr lang="en-US" smtClean="0"/>
-              <a:t>9/16/22</a:t>
+              <a:t>3/28/24</a:t>
             </a:fld>
             <a:endParaRPr lang="en-US"/>
           </a:p>
@@ -1815,7 +1815,7 @@
           <a:p>
             <a:fld id="{FD36D0CE-793F-FB41-AD4F-0C45D94A4FBD}" type="datetimeFigureOut">
               <a:rPr lang="en-US" smtClean="0"/>
-              <a:t>9/16/22</a:t>
+              <a:t>3/28/24</a:t>
             </a:fld>
             <a:endParaRPr lang="en-US"/>
           </a:p>
@@ -1956,7 +1956,7 @@
           <a:p>
             <a:fld id="{FD36D0CE-793F-FB41-AD4F-0C45D94A4FBD}" type="datetimeFigureOut">
               <a:rPr lang="en-US" smtClean="0"/>
-              <a:t>9/16/22</a:t>
+              <a:t>3/28/24</a:t>
             </a:fld>
             <a:endParaRPr lang="en-US"/>
           </a:p>
@@ -2069,7 +2069,7 @@
           <a:p>
             <a:fld id="{FD36D0CE-793F-FB41-AD4F-0C45D94A4FBD}" type="datetimeFigureOut">
               <a:rPr lang="en-US" smtClean="0"/>
-              <a:t>9/16/22</a:t>
+              <a:t>3/28/24</a:t>
             </a:fld>
             <a:endParaRPr lang="en-US"/>
           </a:p>
@@ -2380,7 +2380,7 @@
           <a:p>
             <a:fld id="{FD36D0CE-793F-FB41-AD4F-0C45D94A4FBD}" type="datetimeFigureOut">
               <a:rPr lang="en-US" smtClean="0"/>
-              <a:t>9/16/22</a:t>
+              <a:t>3/28/24</a:t>
             </a:fld>
             <a:endParaRPr lang="en-US"/>
           </a:p>
@@ -2668,7 +2668,7 @@
           <a:p>
             <a:fld id="{FD36D0CE-793F-FB41-AD4F-0C45D94A4FBD}" type="datetimeFigureOut">
               <a:rPr lang="en-US" smtClean="0"/>
-              <a:t>9/16/22</a:t>
+              <a:t>3/28/24</a:t>
             </a:fld>
             <a:endParaRPr lang="en-US"/>
           </a:p>
@@ -2909,7 +2909,7 @@
           <a:p>
             <a:fld id="{FD36D0CE-793F-FB41-AD4F-0C45D94A4FBD}" type="datetimeFigureOut">
               <a:rPr lang="en-US" smtClean="0"/>
-              <a:t>9/16/22</a:t>
+              <a:t>3/28/24</a:t>
             </a:fld>
             <a:endParaRPr lang="en-US"/>
           </a:p>
@@ -6009,36 +6009,61 @@
           </a:p>
         </p:txBody>
       </p:sp>
-      <p:pic>
-        <p:nvPicPr>
-          <p:cNvPr id="53" name="Picture 52" descr="Shape&#10;&#10;Description automatically generated">
-            <a:extLst>
-              <a:ext uri="{FF2B5EF4-FFF2-40B4-BE49-F238E27FC236}">
-                <a16:creationId xmlns:a16="http://schemas.microsoft.com/office/drawing/2014/main" id="{7A680908-7471-579E-667D-5E2514AC14FC}"/>
-              </a:ext>
-            </a:extLst>
-          </p:cNvPr>
-          <p:cNvPicPr>
-            <a:picLocks noChangeAspect="1"/>
-          </p:cNvPicPr>
+      <p:sp>
+        <p:nvSpPr>
+          <p:cNvPr id="3" name="직사각형 255">
+            <a:extLst>
+              <a:ext uri="{FF2B5EF4-FFF2-40B4-BE49-F238E27FC236}">
+                <a16:creationId xmlns:a16="http://schemas.microsoft.com/office/drawing/2014/main" id="{EBF99CEC-1A1F-F30F-B118-09EB3F403891}"/>
+              </a:ext>
+            </a:extLst>
+          </p:cNvPr>
+          <p:cNvSpPr/>
           <p:nvPr/>
-        </p:nvPicPr>
-        <p:blipFill>
-          <a:blip r:embed="rId9"/>
-          <a:stretch>
-            <a:fillRect/>
-          </a:stretch>
-        </p:blipFill>
-        <p:spPr>
-          <a:xfrm>
-            <a:off x="7487040" y="1739046"/>
-            <a:ext cx="789306" cy="746409"/>
+        </p:nvSpPr>
+        <p:spPr>
+          <a:xfrm>
+            <a:off x="7602029" y="1821756"/>
+            <a:ext cx="572208" cy="553998"/>
           </a:xfrm>
           <a:prstGeom prst="rect">
             <a:avLst/>
           </a:prstGeom>
         </p:spPr>
-      </p:pic>
+        <p:txBody>
+          <a:bodyPr wrap="none" lIns="0" tIns="0" rIns="0" bIns="0">
+            <a:spAutoFit/>
+          </a:bodyPr>
+          <a:lstStyle/>
+          <a:p>
+            <a:r>
+              <a:rPr lang="en-US" altLang="ko-KR" sz="1200" b="1" dirty="0">
+                <a:latin typeface="Calibri" panose="020F0502020204030204" pitchFamily="34" charset="0"/>
+              </a:rPr>
+              <a:t>NetIQ</a:t>
+            </a:r>
+          </a:p>
+          <a:p>
+            <a:r>
+              <a:rPr lang="en-US" altLang="ko-KR" sz="1200" b="1" dirty="0">
+                <a:latin typeface="Calibri" panose="020F0502020204030204" pitchFamily="34" charset="0"/>
+              </a:rPr>
+              <a:t>Access</a:t>
+            </a:r>
+          </a:p>
+          <a:p>
+            <a:r>
+              <a:rPr lang="en-US" altLang="ko-KR" sz="1200" b="1" dirty="0">
+                <a:latin typeface="Calibri" panose="020F0502020204030204" pitchFamily="34" charset="0"/>
+              </a:rPr>
+              <a:t>Manager</a:t>
+            </a:r>
+            <a:endParaRPr lang="ko-KR" altLang="en-US" sz="1200" b="1" dirty="0">
+              <a:latin typeface="Calibri" panose="020F0502020204030204" pitchFamily="34" charset="0"/>
+            </a:endParaRPr>
+          </a:p>
+        </p:txBody>
+      </p:sp>
     </p:spTree>
     <p:extLst>
       <p:ext uri="{BB962C8B-B14F-4D97-AF65-F5344CB8AC3E}">

</xml_diff>